<commit_message>
adjusted powerpoint to be less slides with same amount of info, and repo layout
</commit_message>
<xml_diff>
--- a/REPORTS/RF3.pptx
+++ b/REPORTS/RF3.pptx
@@ -6,11 +6,9 @@
   </p:sldMasterIdLst>
   <p:sldIdLst>
     <p:sldId id="256" r:id="rId2"/>
-    <p:sldId id="257" r:id="rId3"/>
-    <p:sldId id="258" r:id="rId4"/>
-    <p:sldId id="259" r:id="rId5"/>
-    <p:sldId id="260" r:id="rId6"/>
-    <p:sldId id="261" r:id="rId7"/>
+    <p:sldId id="258" r:id="rId3"/>
+    <p:sldId id="262" r:id="rId4"/>
+    <p:sldId id="263" r:id="rId5"/>
   </p:sldIdLst>
   <p:sldSz cx="12192000" cy="6858000"/>
   <p:notesSz cx="6858000" cy="9144000"/>
@@ -109,7 +107,282 @@
       </a:defRPr>
     </a:lvl9pPr>
   </p:defaultTextStyle>
+  <p:extLst>
+    <p:ext uri="{EFAFB233-063F-42B5-8137-9DF3F51BA10A}">
+      <p15:sldGuideLst xmlns:p15="http://schemas.microsoft.com/office/powerpoint/2012/main"/>
+    </p:ext>
+  </p:extLst>
 </p:presentation>
+</file>
+
+<file path=ppt/revisionInfo.xml><?xml version="1.0" encoding="utf-8"?>
+<p1510:revInfo xmlns:a="http://schemas.openxmlformats.org/drawingml/2006/main" xmlns:r="http://schemas.openxmlformats.org/officeDocument/2006/relationships" xmlns:p1510="http://schemas.microsoft.com/office/powerpoint/2015/10/main">
+  <p1510:revLst>
+    <p1510:client id="{D00E7137-4E9A-4868-9856-F4B9E09D2382}" v="21" dt="2019-10-15T01:37:53.495"/>
+  </p1510:revLst>
+</p1510:revInfo>
+</file>
+
+<file path=ppt/changesInfos/changesInfo1.xml><?xml version="1.0" encoding="utf-8"?>
+<pc:chgInfo xmlns:a="http://schemas.openxmlformats.org/drawingml/2006/main" xmlns:r="http://schemas.openxmlformats.org/officeDocument/2006/relationships" xmlns:ac="http://schemas.microsoft.com/office/drawing/2013/main/command" xmlns:pc="http://schemas.microsoft.com/office/powerpoint/2013/main/command">
+  <pc:docChgLst>
+    <pc:chgData name="willie schottler" userId="474cf4eb21bcde59" providerId="LiveId" clId="{D00E7137-4E9A-4868-9856-F4B9E09D2382}"/>
+    <pc:docChg chg="custSel addSld delSld modSld">
+      <pc:chgData name="willie schottler" userId="474cf4eb21bcde59" providerId="LiveId" clId="{D00E7137-4E9A-4868-9856-F4B9E09D2382}" dt="2019-10-15T01:37:53.495" v="97"/>
+      <pc:docMkLst>
+        <pc:docMk/>
+      </pc:docMkLst>
+      <pc:sldChg chg="modSp">
+        <pc:chgData name="willie schottler" userId="474cf4eb21bcde59" providerId="LiveId" clId="{D00E7137-4E9A-4868-9856-F4B9E09D2382}" dt="2019-10-15T01:20:30.061" v="15" actId="20577"/>
+        <pc:sldMkLst>
+          <pc:docMk/>
+          <pc:sldMk cId="3193833284" sldId="256"/>
+        </pc:sldMkLst>
+        <pc:spChg chg="mod">
+          <ac:chgData name="willie schottler" userId="474cf4eb21bcde59" providerId="LiveId" clId="{D00E7137-4E9A-4868-9856-F4B9E09D2382}" dt="2019-10-15T01:20:30.061" v="15" actId="20577"/>
+          <ac:spMkLst>
+            <pc:docMk/>
+            <pc:sldMk cId="3193833284" sldId="256"/>
+            <ac:spMk id="2" creationId="{CC26C7A0-780F-704C-903D-8D29A3DDBC2F}"/>
+          </ac:spMkLst>
+        </pc:spChg>
+      </pc:sldChg>
+      <pc:sldChg chg="modSp del">
+        <pc:chgData name="willie schottler" userId="474cf4eb21bcde59" providerId="LiveId" clId="{D00E7137-4E9A-4868-9856-F4B9E09D2382}" dt="2019-10-15T01:37:07.800" v="78" actId="2696"/>
+        <pc:sldMkLst>
+          <pc:docMk/>
+          <pc:sldMk cId="2144557300" sldId="257"/>
+        </pc:sldMkLst>
+        <pc:spChg chg="mod">
+          <ac:chgData name="willie schottler" userId="474cf4eb21bcde59" providerId="LiveId" clId="{D00E7137-4E9A-4868-9856-F4B9E09D2382}" dt="2019-10-15T01:36:55.325" v="75"/>
+          <ac:spMkLst>
+            <pc:docMk/>
+            <pc:sldMk cId="2144557300" sldId="257"/>
+            <ac:spMk id="2" creationId="{715B4A8A-4C8B-384F-AFC3-94B40DDEDE16}"/>
+          </ac:spMkLst>
+        </pc:spChg>
+      </pc:sldChg>
+      <pc:sldChg chg="addSp delSp modSp">
+        <pc:chgData name="willie schottler" userId="474cf4eb21bcde59" providerId="LiveId" clId="{D00E7137-4E9A-4868-9856-F4B9E09D2382}" dt="2019-10-15T01:37:04.603" v="77"/>
+        <pc:sldMkLst>
+          <pc:docMk/>
+          <pc:sldMk cId="1358007658" sldId="258"/>
+        </pc:sldMkLst>
+        <pc:spChg chg="add del mod">
+          <ac:chgData name="willie schottler" userId="474cf4eb21bcde59" providerId="LiveId" clId="{D00E7137-4E9A-4868-9856-F4B9E09D2382}" dt="2019-10-15T01:34:10.974" v="73"/>
+          <ac:spMkLst>
+            <pc:docMk/>
+            <pc:sldMk cId="1358007658" sldId="258"/>
+            <ac:spMk id="4" creationId="{F155B08E-F4B7-49ED-BBC8-A05F160DA001}"/>
+          </ac:spMkLst>
+        </pc:spChg>
+        <pc:spChg chg="add del mod">
+          <ac:chgData name="willie schottler" userId="474cf4eb21bcde59" providerId="LiveId" clId="{D00E7137-4E9A-4868-9856-F4B9E09D2382}" dt="2019-10-15T01:36:49.738" v="74" actId="478"/>
+          <ac:spMkLst>
+            <pc:docMk/>
+            <pc:sldMk cId="1358007658" sldId="258"/>
+            <ac:spMk id="5" creationId="{59AD2BF1-E4A2-43B7-8097-706218F4ECDA}"/>
+          </ac:spMkLst>
+        </pc:spChg>
+        <pc:spChg chg="add mod">
+          <ac:chgData name="willie schottler" userId="474cf4eb21bcde59" providerId="LiveId" clId="{D00E7137-4E9A-4868-9856-F4B9E09D2382}" dt="2019-10-15T01:36:57.537" v="76"/>
+          <ac:spMkLst>
+            <pc:docMk/>
+            <pc:sldMk cId="1358007658" sldId="258"/>
+            <ac:spMk id="6" creationId="{286F003E-FCC1-4592-951D-0C163498F599}"/>
+          </ac:spMkLst>
+        </pc:spChg>
+        <pc:spChg chg="add mod">
+          <ac:chgData name="willie schottler" userId="474cf4eb21bcde59" providerId="LiveId" clId="{D00E7137-4E9A-4868-9856-F4B9E09D2382}" dt="2019-10-15T01:37:04.603" v="77"/>
+          <ac:spMkLst>
+            <pc:docMk/>
+            <pc:sldMk cId="1358007658" sldId="258"/>
+            <ac:spMk id="7" creationId="{E60FF698-7953-4A5F-A1EC-78590700707A}"/>
+          </ac:spMkLst>
+        </pc:spChg>
+      </pc:sldChg>
+      <pc:sldChg chg="del">
+        <pc:chgData name="willie schottler" userId="474cf4eb21bcde59" providerId="LiveId" clId="{D00E7137-4E9A-4868-9856-F4B9E09D2382}" dt="2019-10-15T01:33:37.015" v="71" actId="2696"/>
+        <pc:sldMkLst>
+          <pc:docMk/>
+          <pc:sldMk cId="787338785" sldId="259"/>
+        </pc:sldMkLst>
+      </pc:sldChg>
+      <pc:sldChg chg="modSp del">
+        <pc:chgData name="willie schottler" userId="474cf4eb21bcde59" providerId="LiveId" clId="{D00E7137-4E9A-4868-9856-F4B9E09D2382}" dt="2019-10-15T01:29:33.201" v="21" actId="2696"/>
+        <pc:sldMkLst>
+          <pc:docMk/>
+          <pc:sldMk cId="8113037" sldId="260"/>
+        </pc:sldMkLst>
+        <pc:picChg chg="mod">
+          <ac:chgData name="willie schottler" userId="474cf4eb21bcde59" providerId="LiveId" clId="{D00E7137-4E9A-4868-9856-F4B9E09D2382}" dt="2019-10-15T01:28:50.946" v="16" actId="14100"/>
+          <ac:picMkLst>
+            <pc:docMk/>
+            <pc:sldMk cId="8113037" sldId="260"/>
+            <ac:picMk id="4" creationId="{ECEE7278-3013-644D-96E3-552D13EBBB70}"/>
+          </ac:picMkLst>
+        </pc:picChg>
+      </pc:sldChg>
+      <pc:sldChg chg="del">
+        <pc:chgData name="willie schottler" userId="474cf4eb21bcde59" providerId="LiveId" clId="{D00E7137-4E9A-4868-9856-F4B9E09D2382}" dt="2019-10-15T01:33:26.181" v="70" actId="2696"/>
+        <pc:sldMkLst>
+          <pc:docMk/>
+          <pc:sldMk cId="2203638032" sldId="261"/>
+        </pc:sldMkLst>
+      </pc:sldChg>
+      <pc:sldChg chg="addSp delSp modSp add">
+        <pc:chgData name="willie schottler" userId="474cf4eb21bcde59" providerId="LiveId" clId="{D00E7137-4E9A-4868-9856-F4B9E09D2382}" dt="2019-10-15T01:33:21.929" v="69" actId="20577"/>
+        <pc:sldMkLst>
+          <pc:docMk/>
+          <pc:sldMk cId="1252623047" sldId="262"/>
+        </pc:sldMkLst>
+        <pc:spChg chg="del">
+          <ac:chgData name="willie schottler" userId="474cf4eb21bcde59" providerId="LiveId" clId="{D00E7137-4E9A-4868-9856-F4B9E09D2382}" dt="2019-10-15T01:29:14.350" v="18"/>
+          <ac:spMkLst>
+            <pc:docMk/>
+            <pc:sldMk cId="1252623047" sldId="262"/>
+            <ac:spMk id="2" creationId="{13CBE4CE-45B2-4E53-BD04-9FB0D218EAA2}"/>
+          </ac:spMkLst>
+        </pc:spChg>
+        <pc:spChg chg="del">
+          <ac:chgData name="willie schottler" userId="474cf4eb21bcde59" providerId="LiveId" clId="{D00E7137-4E9A-4868-9856-F4B9E09D2382}" dt="2019-10-15T01:29:14.350" v="18"/>
+          <ac:spMkLst>
+            <pc:docMk/>
+            <pc:sldMk cId="1252623047" sldId="262"/>
+            <ac:spMk id="3" creationId="{CD86496B-CA7D-4A5B-A9BA-5C3E69941187}"/>
+          </ac:spMkLst>
+        </pc:spChg>
+        <pc:spChg chg="add mod">
+          <ac:chgData name="willie schottler" userId="474cf4eb21bcde59" providerId="LiveId" clId="{D00E7137-4E9A-4868-9856-F4B9E09D2382}" dt="2019-10-15T01:33:21.929" v="69" actId="20577"/>
+          <ac:spMkLst>
+            <pc:docMk/>
+            <pc:sldMk cId="1252623047" sldId="262"/>
+            <ac:spMk id="4" creationId="{0FF2F052-F93B-437F-9C3A-325B4400E395}"/>
+          </ac:spMkLst>
+        </pc:spChg>
+        <pc:spChg chg="add mod">
+          <ac:chgData name="willie schottler" userId="474cf4eb21bcde59" providerId="LiveId" clId="{D00E7137-4E9A-4868-9856-F4B9E09D2382}" dt="2019-10-15T01:30:23.808" v="27" actId="1076"/>
+          <ac:spMkLst>
+            <pc:docMk/>
+            <pc:sldMk cId="1252623047" sldId="262"/>
+            <ac:spMk id="5" creationId="{98E01CDA-D2E6-47D2-9AD3-EE82767A43FB}"/>
+          </ac:spMkLst>
+        </pc:spChg>
+        <pc:spChg chg="add del mod">
+          <ac:chgData name="willie schottler" userId="474cf4eb21bcde59" providerId="LiveId" clId="{D00E7137-4E9A-4868-9856-F4B9E09D2382}" dt="2019-10-15T01:29:18.545" v="19"/>
+          <ac:spMkLst>
+            <pc:docMk/>
+            <pc:sldMk cId="1252623047" sldId="262"/>
+            <ac:spMk id="6" creationId="{F157578E-9D8E-4687-94DF-907BE6874804}"/>
+          </ac:spMkLst>
+        </pc:spChg>
+        <pc:spChg chg="add mod">
+          <ac:chgData name="willie schottler" userId="474cf4eb21bcde59" providerId="LiveId" clId="{D00E7137-4E9A-4868-9856-F4B9E09D2382}" dt="2019-10-15T01:30:59.475" v="28"/>
+          <ac:spMkLst>
+            <pc:docMk/>
+            <pc:sldMk cId="1252623047" sldId="262"/>
+            <ac:spMk id="7" creationId="{95B0038D-3786-4079-973E-D82A9BCD5EDF}"/>
+          </ac:spMkLst>
+        </pc:spChg>
+        <pc:spChg chg="add mod">
+          <ac:chgData name="willie schottler" userId="474cf4eb21bcde59" providerId="LiveId" clId="{D00E7137-4E9A-4868-9856-F4B9E09D2382}" dt="2019-10-15T01:31:05.483" v="30" actId="27636"/>
+          <ac:spMkLst>
+            <pc:docMk/>
+            <pc:sldMk cId="1252623047" sldId="262"/>
+            <ac:spMk id="8" creationId="{C794790B-3433-46AD-80BE-8C810F064E14}"/>
+          </ac:spMkLst>
+        </pc:spChg>
+        <pc:spChg chg="add del mod">
+          <ac:chgData name="willie schottler" userId="474cf4eb21bcde59" providerId="LiveId" clId="{D00E7137-4E9A-4868-9856-F4B9E09D2382}" dt="2019-10-15T01:30:20.973" v="26"/>
+          <ac:spMkLst>
+            <pc:docMk/>
+            <pc:sldMk cId="1252623047" sldId="262"/>
+            <ac:spMk id="10" creationId="{68F9AF4B-4635-4D63-A04F-38D74A28C89F}"/>
+          </ac:spMkLst>
+        </pc:spChg>
+        <pc:spChg chg="add mod">
+          <ac:chgData name="willie schottler" userId="474cf4eb21bcde59" providerId="LiveId" clId="{D00E7137-4E9A-4868-9856-F4B9E09D2382}" dt="2019-10-15T01:32:04.009" v="42" actId="207"/>
+          <ac:spMkLst>
+            <pc:docMk/>
+            <pc:sldMk cId="1252623047" sldId="262"/>
+            <ac:spMk id="11" creationId="{417F0FC8-945F-4718-9617-99EB09C9993B}"/>
+          </ac:spMkLst>
+        </pc:spChg>
+        <pc:spChg chg="add mod">
+          <ac:chgData name="willie schottler" userId="474cf4eb21bcde59" providerId="LiveId" clId="{D00E7137-4E9A-4868-9856-F4B9E09D2382}" dt="2019-10-15T01:32:43.961" v="50" actId="1076"/>
+          <ac:spMkLst>
+            <pc:docMk/>
+            <pc:sldMk cId="1252623047" sldId="262"/>
+            <ac:spMk id="12" creationId="{2CF9BE27-985D-44FF-89C5-8F3EE01F89CB}"/>
+          </ac:spMkLst>
+        </pc:spChg>
+        <pc:picChg chg="add mod">
+          <ac:chgData name="willie schottler" userId="474cf4eb21bcde59" providerId="LiveId" clId="{D00E7137-4E9A-4868-9856-F4B9E09D2382}" dt="2019-10-15T01:29:18.545" v="19"/>
+          <ac:picMkLst>
+            <pc:docMk/>
+            <pc:sldMk cId="1252623047" sldId="262"/>
+            <ac:picMk id="9" creationId="{55DA0C5E-3B7D-48B5-8532-AD54B968F02A}"/>
+          </ac:picMkLst>
+        </pc:picChg>
+      </pc:sldChg>
+      <pc:sldChg chg="addSp delSp modSp add">
+        <pc:chgData name="willie schottler" userId="474cf4eb21bcde59" providerId="LiveId" clId="{D00E7137-4E9A-4868-9856-F4B9E09D2382}" dt="2019-10-15T01:37:53.495" v="97"/>
+        <pc:sldMkLst>
+          <pc:docMk/>
+          <pc:sldMk cId="1365661393" sldId="263"/>
+        </pc:sldMkLst>
+        <pc:spChg chg="del">
+          <ac:chgData name="willie schottler" userId="474cf4eb21bcde59" providerId="LiveId" clId="{D00E7137-4E9A-4868-9856-F4B9E09D2382}" dt="2019-10-15T01:37:30.874" v="80"/>
+          <ac:spMkLst>
+            <pc:docMk/>
+            <pc:sldMk cId="1365661393" sldId="263"/>
+            <ac:spMk id="2" creationId="{E24855EA-CD3F-48AE-A7DF-BE9903F69467}"/>
+          </ac:spMkLst>
+        </pc:spChg>
+        <pc:spChg chg="del">
+          <ac:chgData name="willie schottler" userId="474cf4eb21bcde59" providerId="LiveId" clId="{D00E7137-4E9A-4868-9856-F4B9E09D2382}" dt="2019-10-15T01:37:30.874" v="80"/>
+          <ac:spMkLst>
+            <pc:docMk/>
+            <pc:sldMk cId="1365661393" sldId="263"/>
+            <ac:spMk id="3" creationId="{388268E1-A93F-4124-9308-F60B6DF95E98}"/>
+          </ac:spMkLst>
+        </pc:spChg>
+        <pc:spChg chg="del">
+          <ac:chgData name="willie schottler" userId="474cf4eb21bcde59" providerId="LiveId" clId="{D00E7137-4E9A-4868-9856-F4B9E09D2382}" dt="2019-10-15T01:37:30.874" v="80"/>
+          <ac:spMkLst>
+            <pc:docMk/>
+            <pc:sldMk cId="1365661393" sldId="263"/>
+            <ac:spMk id="4" creationId="{2E9391BE-A522-4894-9EAB-5D672BE8A012}"/>
+          </ac:spMkLst>
+        </pc:spChg>
+        <pc:spChg chg="add mod">
+          <ac:chgData name="willie schottler" userId="474cf4eb21bcde59" providerId="LiveId" clId="{D00E7137-4E9A-4868-9856-F4B9E09D2382}" dt="2019-10-15T01:37:45.167" v="96" actId="122"/>
+          <ac:spMkLst>
+            <pc:docMk/>
+            <pc:sldMk cId="1365661393" sldId="263"/>
+            <ac:spMk id="5" creationId="{8FC0F50A-ED45-498B-AB80-267D351BE9A8}"/>
+          </ac:spMkLst>
+        </pc:spChg>
+        <pc:spChg chg="add del mod">
+          <ac:chgData name="willie schottler" userId="474cf4eb21bcde59" providerId="LiveId" clId="{D00E7137-4E9A-4868-9856-F4B9E09D2382}" dt="2019-10-15T01:37:53.495" v="97"/>
+          <ac:spMkLst>
+            <pc:docMk/>
+            <pc:sldMk cId="1365661393" sldId="263"/>
+            <ac:spMk id="6" creationId="{47EDE6E4-499B-4B69-8FB3-0B0B01E1B174}"/>
+          </ac:spMkLst>
+        </pc:spChg>
+        <pc:spChg chg="add mod">
+          <ac:chgData name="willie schottler" userId="474cf4eb21bcde59" providerId="LiveId" clId="{D00E7137-4E9A-4868-9856-F4B9E09D2382}" dt="2019-10-15T01:37:53.495" v="97"/>
+          <ac:spMkLst>
+            <pc:docMk/>
+            <pc:sldMk cId="1365661393" sldId="263"/>
+            <ac:spMk id="7" creationId="{F8A3CFD0-CE28-4D22-8A5B-49980DA02CFE}"/>
+          </ac:spMkLst>
+        </pc:spChg>
+      </pc:sldChg>
+    </pc:docChg>
+  </pc:docChgLst>
+</pc:chgInfo>
 </file>
 
 <file path=ppt/slideLayouts/slideLayout1.xml><?xml version="1.0" encoding="utf-8"?>
@@ -251,7 +524,7 @@
           <a:p>
             <a:fld id="{48A87A34-81AB-432B-8DAE-1953F412C126}" type="datetimeFigureOut">
               <a:rPr lang="en-US" dirty="0"/>
-              <a:t>10/14/19</a:t>
+              <a:t>10/14/2019</a:t>
             </a:fld>
             <a:endParaRPr lang="en-US" dirty="0"/>
           </a:p>
@@ -457,7 +730,7 @@
           <a:p>
             <a:fld id="{48A87A34-81AB-432B-8DAE-1953F412C126}" type="datetimeFigureOut">
               <a:rPr lang="en-US" dirty="0"/>
-              <a:t>10/14/19</a:t>
+              <a:t>10/14/2019</a:t>
             </a:fld>
             <a:endParaRPr lang="en-US" dirty="0"/>
           </a:p>
@@ -667,7 +940,7 @@
           <a:p>
             <a:fld id="{48A87A34-81AB-432B-8DAE-1953F412C126}" type="datetimeFigureOut">
               <a:rPr lang="en-US" dirty="0"/>
-              <a:t>10/14/19</a:t>
+              <a:t>10/14/2019</a:t>
             </a:fld>
             <a:endParaRPr lang="en-US" dirty="0"/>
           </a:p>
@@ -863,7 +1136,7 @@
           <a:p>
             <a:fld id="{48A87A34-81AB-432B-8DAE-1953F412C126}" type="datetimeFigureOut">
               <a:rPr lang="en-US" dirty="0"/>
-              <a:t>10/14/19</a:t>
+              <a:t>10/14/2019</a:t>
             </a:fld>
             <a:endParaRPr lang="en-US" dirty="0"/>
           </a:p>
@@ -1137,7 +1410,7 @@
           <a:p>
             <a:fld id="{48A87A34-81AB-432B-8DAE-1953F412C126}" type="datetimeFigureOut">
               <a:rPr lang="en-US" dirty="0"/>
-              <a:t>10/14/19</a:t>
+              <a:t>10/14/2019</a:t>
             </a:fld>
             <a:endParaRPr lang="en-US" dirty="0"/>
           </a:p>
@@ -1400,7 +1673,7 @@
           <a:p>
             <a:fld id="{48A87A34-81AB-432B-8DAE-1953F412C126}" type="datetimeFigureOut">
               <a:rPr lang="en-US" dirty="0"/>
-              <a:t>10/14/19</a:t>
+              <a:t>10/14/2019</a:t>
             </a:fld>
             <a:endParaRPr lang="en-US" dirty="0"/>
           </a:p>
@@ -1811,7 +2084,7 @@
           <a:p>
             <a:fld id="{48A87A34-81AB-432B-8DAE-1953F412C126}" type="datetimeFigureOut">
               <a:rPr lang="en-US" dirty="0"/>
-              <a:t>10/14/19</a:t>
+              <a:t>10/14/2019</a:t>
             </a:fld>
             <a:endParaRPr lang="en-US" dirty="0"/>
           </a:p>
@@ -1955,7 +2228,7 @@
           <a:p>
             <a:fld id="{48A87A34-81AB-432B-8DAE-1953F412C126}" type="datetimeFigureOut">
               <a:rPr lang="en-US" dirty="0"/>
-              <a:t>10/14/19</a:t>
+              <a:t>10/14/2019</a:t>
             </a:fld>
             <a:endParaRPr lang="en-US" dirty="0"/>
           </a:p>
@@ -2076,7 +2349,7 @@
           <a:p>
             <a:fld id="{48A87A34-81AB-432B-8DAE-1953F412C126}" type="datetimeFigureOut">
               <a:rPr lang="en-US" dirty="0"/>
-              <a:t>10/14/19</a:t>
+              <a:t>10/14/2019</a:t>
             </a:fld>
             <a:endParaRPr lang="en-US" dirty="0"/>
           </a:p>
@@ -2322,7 +2595,7 @@
           <a:p>
             <a:fld id="{48A87A34-81AB-432B-8DAE-1953F412C126}" type="datetimeFigureOut">
               <a:rPr lang="en-US" dirty="0"/>
-              <a:t>10/14/19</a:t>
+              <a:t>10/14/2019</a:t>
             </a:fld>
             <a:endParaRPr lang="en-US" dirty="0"/>
           </a:p>
@@ -2763,7 +3036,7 @@
             <a:fld id="{48A87A34-81AB-432B-8DAE-1953F412C126}" type="datetimeFigureOut">
               <a:rPr lang="en-US" dirty="0"/>
               <a:pPr/>
-              <a:t>10/14/19</a:t>
+              <a:t>10/14/2019</a:t>
             </a:fld>
             <a:endParaRPr lang="en-US" dirty="0"/>
           </a:p>
@@ -3086,7 +3359,7 @@
             <a:fld id="{48A87A34-81AB-432B-8DAE-1953F412C126}" type="datetimeFigureOut">
               <a:rPr lang="en-US" dirty="0"/>
               <a:pPr/>
-              <a:t>10/14/19</a:t>
+              <a:t>10/14/2019</a:t>
             </a:fld>
             <a:endParaRPr lang="en-US" dirty="0"/>
           </a:p>
@@ -3586,11 +3859,20 @@
         </p:nvSpPr>
         <p:spPr/>
         <p:txBody>
-          <a:bodyPr/>
+          <a:bodyPr>
+            <a:normAutofit/>
+          </a:bodyPr>
           <a:lstStyle/>
           <a:p>
             <a:r>
               <a:rPr lang="en-US" dirty="0"/>
+              <a:t>Team17</a:t>
+            </a:r>
+            <a:br>
+              <a:rPr lang="en-US" sz="3200" dirty="0"/>
+            </a:br>
+            <a:r>
+              <a:rPr lang="en-US" sz="3200" dirty="0"/>
               <a:t>RF-3</a:t>
             </a:r>
           </a:p>
@@ -3688,7 +3970,7 @@
           <p:cNvPr id="2" name="Title 1">
             <a:extLst>
               <a:ext uri="{FF2B5EF4-FFF2-40B4-BE49-F238E27FC236}">
-                <a16:creationId xmlns:a16="http://schemas.microsoft.com/office/drawing/2014/main" id="{715B4A8A-4C8B-384F-AFC3-94B40DDEDE16}"/>
+                <a16:creationId xmlns:a16="http://schemas.microsoft.com/office/drawing/2014/main" id="{FE3842DD-FECF-A24D-8F52-9AA0F4151F83}"/>
               </a:ext>
             </a:extLst>
           </p:cNvPr>
@@ -3706,7 +3988,7 @@
           <a:p>
             <a:r>
               <a:rPr lang="en-US" dirty="0"/>
-              <a:t>Updates</a:t>
+              <a:t>Overview of project</a:t>
             </a:r>
           </a:p>
         </p:txBody>
@@ -3716,7 +3998,7 @@
           <p:cNvPr id="3" name="Content Placeholder 2">
             <a:extLst>
               <a:ext uri="{FF2B5EF4-FFF2-40B4-BE49-F238E27FC236}">
-                <a16:creationId xmlns:a16="http://schemas.microsoft.com/office/drawing/2014/main" id="{B408827F-DB91-0543-902F-05DA472B1A9C}"/>
+                <a16:creationId xmlns:a16="http://schemas.microsoft.com/office/drawing/2014/main" id="{88F5CDDE-ACE7-A44F-8199-402CA66F6025}"/>
               </a:ext>
             </a:extLst>
           </p:cNvPr>
@@ -3724,7 +4006,84 @@
             <a:spLocks noGrp="1"/>
           </p:cNvSpPr>
           <p:nvPr>
-            <p:ph idx="1"/>
+            <p:ph sz="half" idx="2"/>
+          </p:nvPr>
+        </p:nvSpPr>
+        <p:spPr/>
+        <p:txBody>
+          <a:bodyPr/>
+          <a:lstStyle/>
+          <a:p>
+            <a:r>
+              <a:rPr lang="en-US" dirty="0"/>
+              <a:t>Modernize NATS halls</a:t>
+            </a:r>
+          </a:p>
+          <a:p>
+            <a:r>
+              <a:rPr lang="en-US" dirty="0"/>
+              <a:t>Replace old 70s looking displays in LF and PS buildings with large touch screen display(s)</a:t>
+            </a:r>
+          </a:p>
+          <a:p>
+            <a:r>
+              <a:rPr lang="en-US" dirty="0"/>
+              <a:t>Will show info on faculty, programs, etc.</a:t>
+            </a:r>
+          </a:p>
+          <a:p>
+            <a:endParaRPr lang="en-US" dirty="0"/>
+          </a:p>
+          <a:p>
+            <a:endParaRPr lang="en-US" dirty="0"/>
+          </a:p>
+          <a:p>
+            <a:endParaRPr lang="en-US" dirty="0"/>
+          </a:p>
+        </p:txBody>
+      </p:sp>
+      <p:sp>
+        <p:nvSpPr>
+          <p:cNvPr id="6" name="Text Placeholder 5">
+            <a:extLst>
+              <a:ext uri="{FF2B5EF4-FFF2-40B4-BE49-F238E27FC236}">
+                <a16:creationId xmlns:a16="http://schemas.microsoft.com/office/drawing/2014/main" id="{286F003E-FCC1-4592-951D-0C163498F599}"/>
+              </a:ext>
+            </a:extLst>
+          </p:cNvPr>
+          <p:cNvSpPr>
+            <a:spLocks noGrp="1"/>
+          </p:cNvSpPr>
+          <p:nvPr>
+            <p:ph type="body" sz="quarter" idx="3"/>
+          </p:nvPr>
+        </p:nvSpPr>
+        <p:spPr/>
+        <p:txBody>
+          <a:bodyPr/>
+          <a:lstStyle/>
+          <a:p>
+            <a:r>
+              <a:rPr lang="en-US" dirty="0"/>
+              <a:t>Updates</a:t>
+            </a:r>
+          </a:p>
+        </p:txBody>
+      </p:sp>
+      <p:sp>
+        <p:nvSpPr>
+          <p:cNvPr id="7" name="Content Placeholder 6">
+            <a:extLst>
+              <a:ext uri="{FF2B5EF4-FFF2-40B4-BE49-F238E27FC236}">
+                <a16:creationId xmlns:a16="http://schemas.microsoft.com/office/drawing/2014/main" id="{E60FF698-7953-4A5F-A1EC-78590700707A}"/>
+              </a:ext>
+            </a:extLst>
+          </p:cNvPr>
+          <p:cNvSpPr>
+            <a:spLocks noGrp="1"/>
+          </p:cNvSpPr>
+          <p:nvPr>
+            <p:ph sz="quarter" idx="4"/>
           </p:nvPr>
         </p:nvSpPr>
         <p:spPr/>
@@ -3748,13 +4107,16 @@
               <a:rPr lang="en-US" dirty="0"/>
               <a:t>Working on creating a timeline for setting everything up</a:t>
             </a:r>
+          </a:p>
+          <a:p>
+            <a:endParaRPr lang="en-US" dirty="0"/>
           </a:p>
         </p:txBody>
       </p:sp>
     </p:spTree>
     <p:extLst>
       <p:ext uri="{BB962C8B-B14F-4D97-AF65-F5344CB8AC3E}">
-        <p14:creationId xmlns:p14="http://schemas.microsoft.com/office/powerpoint/2010/main" val="2144557300"/>
+        <p14:creationId xmlns:p14="http://schemas.microsoft.com/office/powerpoint/2010/main" val="1358007658"/>
       </p:ext>
     </p:extLst>
   </p:cSld>
@@ -3783,10 +4145,10 @@
       </p:grpSpPr>
       <p:sp>
         <p:nvSpPr>
-          <p:cNvPr id="2" name="Title 1">
+          <p:cNvPr id="4" name="Title 3">
             <a:extLst>
               <a:ext uri="{FF2B5EF4-FFF2-40B4-BE49-F238E27FC236}">
-                <a16:creationId xmlns:a16="http://schemas.microsoft.com/office/drawing/2014/main" id="{FE3842DD-FECF-A24D-8F52-9AA0F4151F83}"/>
+                <a16:creationId xmlns:a16="http://schemas.microsoft.com/office/drawing/2014/main" id="{0FF2F052-F93B-437F-9C3A-325B4400E395}"/>
               </a:ext>
             </a:extLst>
           </p:cNvPr>
@@ -3804,17 +4166,17 @@
           <a:p>
             <a:r>
               <a:rPr lang="en-US" dirty="0"/>
-              <a:t>Overview of project</a:t>
-            </a:r>
-          </a:p>
-        </p:txBody>
-      </p:sp>
-      <p:sp>
-        <p:nvSpPr>
-          <p:cNvPr id="3" name="Content Placeholder 2">
+              <a:t>System Design</a:t>
+            </a:r>
+          </a:p>
+        </p:txBody>
+      </p:sp>
+      <p:sp>
+        <p:nvSpPr>
+          <p:cNvPr id="5" name="Text Placeholder 4">
             <a:extLst>
               <a:ext uri="{FF2B5EF4-FFF2-40B4-BE49-F238E27FC236}">
-                <a16:creationId xmlns:a16="http://schemas.microsoft.com/office/drawing/2014/main" id="{88F5CDDE-ACE7-A44F-8199-402CA66F6025}"/>
+                <a16:creationId xmlns:a16="http://schemas.microsoft.com/office/drawing/2014/main" id="{98E01CDA-D2E6-47D2-9AD3-EE82767A43FB}"/>
               </a:ext>
             </a:extLst>
           </p:cNvPr>
@@ -3822,7 +4184,72 @@
             <a:spLocks noGrp="1"/>
           </p:cNvSpPr>
           <p:nvPr>
-            <p:ph idx="1"/>
+            <p:ph type="body" idx="1"/>
+          </p:nvPr>
+        </p:nvSpPr>
+        <p:spPr>
+          <a:xfrm>
+            <a:off x="1447800" y="2024553"/>
+            <a:ext cx="4645152" cy="801943"/>
+          </a:xfrm>
+        </p:spPr>
+        <p:txBody>
+          <a:bodyPr/>
+          <a:lstStyle/>
+          <a:p>
+            <a:r>
+              <a:rPr lang="en-US" dirty="0"/>
+              <a:t>Hardware/software mapping</a:t>
+            </a:r>
+          </a:p>
+        </p:txBody>
+      </p:sp>
+      <p:pic>
+        <p:nvPicPr>
+          <p:cNvPr id="9" name="Content Placeholder 8">
+            <a:extLst>
+              <a:ext uri="{FF2B5EF4-FFF2-40B4-BE49-F238E27FC236}">
+                <a16:creationId xmlns:a16="http://schemas.microsoft.com/office/drawing/2014/main" id="{55DA0C5E-3B7D-48B5-8532-AD54B968F02A}"/>
+              </a:ext>
+            </a:extLst>
+          </p:cNvPr>
+          <p:cNvPicPr>
+            <a:picLocks noGrp="1" noChangeAspect="1"/>
+          </p:cNvPicPr>
+          <p:nvPr>
+            <p:ph sz="half" idx="2"/>
+          </p:nvPr>
+        </p:nvPicPr>
+        <p:blipFill>
+          <a:blip r:embed="rId2"/>
+          <a:stretch>
+            <a:fillRect/>
+          </a:stretch>
+        </p:blipFill>
+        <p:spPr>
+          <a:xfrm>
+            <a:off x="1447800" y="3174782"/>
+            <a:ext cx="4645025" cy="1943537"/>
+          </a:xfrm>
+          <a:prstGeom prst="rect">
+            <a:avLst/>
+          </a:prstGeom>
+        </p:spPr>
+      </p:pic>
+      <p:sp>
+        <p:nvSpPr>
+          <p:cNvPr id="7" name="Text Placeholder 6">
+            <a:extLst>
+              <a:ext uri="{FF2B5EF4-FFF2-40B4-BE49-F238E27FC236}">
+                <a16:creationId xmlns:a16="http://schemas.microsoft.com/office/drawing/2014/main" id="{95B0038D-3786-4079-973E-D82A9BCD5EDF}"/>
+              </a:ext>
+            </a:extLst>
+          </p:cNvPr>
+          <p:cNvSpPr>
+            <a:spLocks noGrp="1"/>
+          </p:cNvSpPr>
+          <p:nvPr>
+            <p:ph type="body" sz="quarter" idx="3"/>
           </p:nvPr>
         </p:nvSpPr>
         <p:spPr/>
@@ -3832,36 +4259,162 @@
           <a:p>
             <a:r>
               <a:rPr lang="en-US" dirty="0"/>
-              <a:t>Modernize NATS halls</a:t>
-            </a:r>
-          </a:p>
+              <a:t>Subsystem decomposition</a:t>
+            </a:r>
+          </a:p>
+        </p:txBody>
+      </p:sp>
+      <p:sp>
+        <p:nvSpPr>
+          <p:cNvPr id="8" name="Content Placeholder 7">
+            <a:extLst>
+              <a:ext uri="{FF2B5EF4-FFF2-40B4-BE49-F238E27FC236}">
+                <a16:creationId xmlns:a16="http://schemas.microsoft.com/office/drawing/2014/main" id="{C794790B-3433-46AD-80BE-8C810F064E14}"/>
+              </a:ext>
+            </a:extLst>
+          </p:cNvPr>
+          <p:cNvSpPr>
+            <a:spLocks noGrp="1"/>
+          </p:cNvSpPr>
+          <p:nvPr>
+            <p:ph sz="quarter" idx="4"/>
+          </p:nvPr>
+        </p:nvSpPr>
+        <p:spPr>
+          <a:xfrm>
+            <a:off x="6412362" y="2821491"/>
+            <a:ext cx="4645152" cy="936777"/>
+          </a:xfrm>
+        </p:spPr>
+        <p:txBody>
+          <a:bodyPr>
+            <a:normAutofit fontScale="62500" lnSpcReduction="20000"/>
+          </a:bodyPr>
+          <a:lstStyle/>
           <a:p>
             <a:r>
               <a:rPr lang="en-US" dirty="0"/>
-              <a:t>Replace old 70s looking displays in LF and PS buildings with large touch screen display(s)</a:t>
+              <a:t>Wall will be made up of either one large display or multiple displays combined as one (similar to large video wall in library)</a:t>
             </a:r>
           </a:p>
           <a:p>
             <a:r>
               <a:rPr lang="en-US" dirty="0"/>
-              <a:t>Will show info on faculty, programs, etc.</a:t>
-            </a:r>
-          </a:p>
-          <a:p>
-            <a:endParaRPr lang="en-US" dirty="0"/>
-          </a:p>
-          <a:p>
-            <a:endParaRPr lang="en-US" dirty="0"/>
-          </a:p>
-          <a:p>
-            <a:endParaRPr lang="en-US" dirty="0"/>
+              <a:t>Need to purchase hardware, software for displays.</a:t>
+            </a:r>
+          </a:p>
+          <a:p>
+            <a:endParaRPr lang="en-US" dirty="0"/>
+          </a:p>
+        </p:txBody>
+      </p:sp>
+      <p:sp>
+        <p:nvSpPr>
+          <p:cNvPr id="11" name="TextBox 10">
+            <a:extLst>
+              <a:ext uri="{FF2B5EF4-FFF2-40B4-BE49-F238E27FC236}">
+                <a16:creationId xmlns:a16="http://schemas.microsoft.com/office/drawing/2014/main" id="{417F0FC8-945F-4718-9617-99EB09C9993B}"/>
+              </a:ext>
+            </a:extLst>
+          </p:cNvPr>
+          <p:cNvSpPr txBox="1"/>
+          <p:nvPr/>
+        </p:nvSpPr>
+        <p:spPr>
+          <a:xfrm>
+            <a:off x="6412362" y="3758268"/>
+            <a:ext cx="4493326" cy="461665"/>
+          </a:xfrm>
+          <a:prstGeom prst="rect">
+            <a:avLst/>
+          </a:prstGeom>
+          <a:noFill/>
+        </p:spPr>
+        <p:txBody>
+          <a:bodyPr wrap="square" rtlCol="0">
+            <a:spAutoFit/>
+          </a:bodyPr>
+          <a:lstStyle/>
+          <a:p>
+            <a:r>
+              <a:rPr lang="en-US" sz="2400" dirty="0">
+                <a:solidFill>
+                  <a:schemeClr val="accent1"/>
+                </a:solidFill>
+              </a:rPr>
+              <a:t>Access control and security</a:t>
+            </a:r>
+            <a:endParaRPr lang="en-US" sz="2200" dirty="0">
+              <a:solidFill>
+                <a:schemeClr val="accent1"/>
+              </a:solidFill>
+            </a:endParaRPr>
+          </a:p>
+        </p:txBody>
+      </p:sp>
+      <p:sp>
+        <p:nvSpPr>
+          <p:cNvPr id="12" name="TextBox 11">
+            <a:extLst>
+              <a:ext uri="{FF2B5EF4-FFF2-40B4-BE49-F238E27FC236}">
+                <a16:creationId xmlns:a16="http://schemas.microsoft.com/office/drawing/2014/main" id="{2CF9BE27-985D-44FF-89C5-8F3EE01F89CB}"/>
+              </a:ext>
+            </a:extLst>
+          </p:cNvPr>
+          <p:cNvSpPr txBox="1"/>
+          <p:nvPr/>
+        </p:nvSpPr>
+        <p:spPr>
+          <a:xfrm>
+            <a:off x="6448526" y="4219933"/>
+            <a:ext cx="4420998" cy="892552"/>
+          </a:xfrm>
+          <a:prstGeom prst="rect">
+            <a:avLst/>
+          </a:prstGeom>
+          <a:noFill/>
+        </p:spPr>
+        <p:txBody>
+          <a:bodyPr wrap="square" rtlCol="0">
+            <a:spAutoFit/>
+          </a:bodyPr>
+          <a:lstStyle/>
+          <a:p>
+            <a:pPr marL="285750" indent="-285750">
+              <a:buFont typeface="Arial" panose="020B0604020202020204" pitchFamily="34" charset="0"/>
+              <a:buChar char="•"/>
+            </a:pPr>
+            <a:r>
+              <a:rPr lang="en-US" sz="1300" dirty="0"/>
+              <a:t>Anyone will be able to access system physically, on campus</a:t>
+            </a:r>
+          </a:p>
+          <a:p>
+            <a:pPr marL="285750" indent="-285750">
+              <a:buFont typeface="Arial" panose="020B0604020202020204" pitchFamily="34" charset="0"/>
+              <a:buChar char="•"/>
+            </a:pPr>
+            <a:r>
+              <a:rPr lang="en-US" sz="1300" dirty="0"/>
+              <a:t>Network will be secured, data will be stored on server elsewhere </a:t>
+            </a:r>
+          </a:p>
+          <a:p>
+            <a:pPr marL="285750" indent="-285750">
+              <a:buFont typeface="Arial" panose="020B0604020202020204" pitchFamily="34" charset="0"/>
+              <a:buChar char="•"/>
+            </a:pPr>
+            <a:r>
+              <a:rPr lang="en-US" sz="1300" dirty="0"/>
+              <a:t>Files will be password protected</a:t>
+            </a:r>
           </a:p>
         </p:txBody>
       </p:sp>
     </p:spTree>
     <p:extLst>
       <p:ext uri="{BB962C8B-B14F-4D97-AF65-F5344CB8AC3E}">
-        <p14:creationId xmlns:p14="http://schemas.microsoft.com/office/powerpoint/2010/main" val="1358007658"/>
+        <p14:creationId xmlns:p14="http://schemas.microsoft.com/office/powerpoint/2010/main" val="1252623047"/>
       </p:ext>
     </p:extLst>
   </p:cSld>
@@ -3890,10 +4443,10 @@
       </p:grpSpPr>
       <p:sp>
         <p:nvSpPr>
-          <p:cNvPr id="2" name="Title 1">
+          <p:cNvPr id="5" name="Title 4">
             <a:extLst>
               <a:ext uri="{FF2B5EF4-FFF2-40B4-BE49-F238E27FC236}">
-                <a16:creationId xmlns:a16="http://schemas.microsoft.com/office/drawing/2014/main" id="{2CB21BC6-2AC6-F943-86F0-FFF63CCFA6D6}"/>
+                <a16:creationId xmlns:a16="http://schemas.microsoft.com/office/drawing/2014/main" id="{8FC0F50A-ED45-498B-AB80-267D351BE9A8}"/>
               </a:ext>
             </a:extLst>
           </p:cNvPr>
@@ -3909,19 +4462,20 @@
           <a:bodyPr/>
           <a:lstStyle/>
           <a:p>
+            <a:pPr algn="ctr"/>
             <a:r>
               <a:rPr lang="en-US" dirty="0"/>
-              <a:t>Subsystem decomposition</a:t>
-            </a:r>
-          </a:p>
-        </p:txBody>
-      </p:sp>
-      <p:sp>
-        <p:nvSpPr>
-          <p:cNvPr id="3" name="Content Placeholder 2">
+              <a:t>Questions</a:t>
+            </a:r>
+          </a:p>
+        </p:txBody>
+      </p:sp>
+      <p:sp>
+        <p:nvSpPr>
+          <p:cNvPr id="7" name="Text Placeholder 6">
             <a:extLst>
               <a:ext uri="{FF2B5EF4-FFF2-40B4-BE49-F238E27FC236}">
-                <a16:creationId xmlns:a16="http://schemas.microsoft.com/office/drawing/2014/main" id="{6C6D4ADB-3DEC-0848-9EA2-82F55DC5F41A}"/>
+                <a16:creationId xmlns:a16="http://schemas.microsoft.com/office/drawing/2014/main" id="{F8A3CFD0-CE28-4D22-8A5B-49980DA02CFE}"/>
               </a:ext>
             </a:extLst>
           </p:cNvPr>
@@ -3929,7 +4483,7 @@
             <a:spLocks noGrp="1"/>
           </p:cNvSpPr>
           <p:nvPr>
-            <p:ph idx="1"/>
+            <p:ph type="body" idx="1"/>
           </p:nvPr>
         </p:nvSpPr>
         <p:spPr/>
@@ -3937,214 +4491,14 @@
           <a:bodyPr/>
           <a:lstStyle/>
           <a:p>
-            <a:r>
-              <a:rPr lang="en-US" dirty="0"/>
-              <a:t>Wall will be made up of either one large display or multiple displays combined as one (similar to large video wall in library)</a:t>
-            </a:r>
-          </a:p>
-          <a:p>
-            <a:r>
-              <a:rPr lang="en-US" dirty="0"/>
-              <a:t>Need to purchase hardware, software for displays.</a:t>
-            </a:r>
+            <a:endParaRPr lang="en-US"/>
           </a:p>
         </p:txBody>
       </p:sp>
     </p:spTree>
     <p:extLst>
       <p:ext uri="{BB962C8B-B14F-4D97-AF65-F5344CB8AC3E}">
-        <p14:creationId xmlns:p14="http://schemas.microsoft.com/office/powerpoint/2010/main" val="787338785"/>
-      </p:ext>
-    </p:extLst>
-  </p:cSld>
-  <p:clrMapOvr>
-    <a:masterClrMapping/>
-  </p:clrMapOvr>
-</p:sld>
-</file>
-
-<file path=ppt/slides/slide5.xml><?xml version="1.0" encoding="utf-8"?>
-<p:sld xmlns:a="http://schemas.openxmlformats.org/drawingml/2006/main" xmlns:r="http://schemas.openxmlformats.org/officeDocument/2006/relationships" xmlns:p="http://schemas.openxmlformats.org/presentationml/2006/main">
-  <p:cSld>
-    <p:spTree>
-      <p:nvGrpSpPr>
-        <p:cNvPr id="1" name=""/>
-        <p:cNvGrpSpPr/>
-        <p:nvPr/>
-      </p:nvGrpSpPr>
-      <p:grpSpPr>
-        <a:xfrm>
-          <a:off x="0" y="0"/>
-          <a:ext cx="0" cy="0"/>
-          <a:chOff x="0" y="0"/>
-          <a:chExt cx="0" cy="0"/>
-        </a:xfrm>
-      </p:grpSpPr>
-      <p:sp>
-        <p:nvSpPr>
-          <p:cNvPr id="2" name="Title 1">
-            <a:extLst>
-              <a:ext uri="{FF2B5EF4-FFF2-40B4-BE49-F238E27FC236}">
-                <a16:creationId xmlns:a16="http://schemas.microsoft.com/office/drawing/2014/main" id="{3F86CC92-B57E-B641-9A0D-3062148F4537}"/>
-              </a:ext>
-            </a:extLst>
-          </p:cNvPr>
-          <p:cNvSpPr>
-            <a:spLocks noGrp="1"/>
-          </p:cNvSpPr>
-          <p:nvPr>
-            <p:ph type="title"/>
-          </p:nvPr>
-        </p:nvSpPr>
-        <p:spPr/>
-        <p:txBody>
-          <a:bodyPr/>
-          <a:lstStyle/>
-          <a:p>
-            <a:r>
-              <a:rPr lang="en-US" dirty="0"/>
-              <a:t>Hardware/software mapping</a:t>
-            </a:r>
-          </a:p>
-        </p:txBody>
-      </p:sp>
-      <p:pic>
-        <p:nvPicPr>
-          <p:cNvPr id="4" name="Content Placeholder 3">
-            <a:extLst>
-              <a:ext uri="{FF2B5EF4-FFF2-40B4-BE49-F238E27FC236}">
-                <a16:creationId xmlns:a16="http://schemas.microsoft.com/office/drawing/2014/main" id="{ECEE7278-3013-644D-96E3-552D13EBBB70}"/>
-              </a:ext>
-            </a:extLst>
-          </p:cNvPr>
-          <p:cNvPicPr>
-            <a:picLocks noGrp="1"/>
-          </p:cNvPicPr>
-          <p:nvPr>
-            <p:ph idx="1"/>
-          </p:nvPr>
-        </p:nvPicPr>
-        <p:blipFill>
-          <a:blip r:embed="rId2"/>
-          <a:stretch>
-            <a:fillRect/>
-          </a:stretch>
-        </p:blipFill>
-        <p:spPr>
-          <a:xfrm>
-            <a:off x="1451579" y="1853753"/>
-            <a:ext cx="9603275" cy="3775521"/>
-          </a:xfrm>
-          <a:prstGeom prst="rect">
-            <a:avLst/>
-          </a:prstGeom>
-        </p:spPr>
-      </p:pic>
-    </p:spTree>
-    <p:extLst>
-      <p:ext uri="{BB962C8B-B14F-4D97-AF65-F5344CB8AC3E}">
-        <p14:creationId xmlns:p14="http://schemas.microsoft.com/office/powerpoint/2010/main" val="8113037"/>
-      </p:ext>
-    </p:extLst>
-  </p:cSld>
-  <p:clrMapOvr>
-    <a:masterClrMapping/>
-  </p:clrMapOvr>
-</p:sld>
-</file>
-
-<file path=ppt/slides/slide6.xml><?xml version="1.0" encoding="utf-8"?>
-<p:sld xmlns:a="http://schemas.openxmlformats.org/drawingml/2006/main" xmlns:r="http://schemas.openxmlformats.org/officeDocument/2006/relationships" xmlns:p="http://schemas.openxmlformats.org/presentationml/2006/main">
-  <p:cSld>
-    <p:spTree>
-      <p:nvGrpSpPr>
-        <p:cNvPr id="1" name=""/>
-        <p:cNvGrpSpPr/>
-        <p:nvPr/>
-      </p:nvGrpSpPr>
-      <p:grpSpPr>
-        <a:xfrm>
-          <a:off x="0" y="0"/>
-          <a:ext cx="0" cy="0"/>
-          <a:chOff x="0" y="0"/>
-          <a:chExt cx="0" cy="0"/>
-        </a:xfrm>
-      </p:grpSpPr>
-      <p:sp>
-        <p:nvSpPr>
-          <p:cNvPr id="2" name="Title 1">
-            <a:extLst>
-              <a:ext uri="{FF2B5EF4-FFF2-40B4-BE49-F238E27FC236}">
-                <a16:creationId xmlns:a16="http://schemas.microsoft.com/office/drawing/2014/main" id="{F00D2E05-86BA-B345-8B0E-8FE01066CD42}"/>
-              </a:ext>
-            </a:extLst>
-          </p:cNvPr>
-          <p:cNvSpPr>
-            <a:spLocks noGrp="1"/>
-          </p:cNvSpPr>
-          <p:nvPr>
-            <p:ph type="title"/>
-          </p:nvPr>
-        </p:nvSpPr>
-        <p:spPr/>
-        <p:txBody>
-          <a:bodyPr/>
-          <a:lstStyle/>
-          <a:p>
-            <a:r>
-              <a:rPr lang="en-US" dirty="0"/>
-              <a:t>Access control and security		</a:t>
-            </a:r>
-          </a:p>
-        </p:txBody>
-      </p:sp>
-      <p:sp>
-        <p:nvSpPr>
-          <p:cNvPr id="3" name="Content Placeholder 2">
-            <a:extLst>
-              <a:ext uri="{FF2B5EF4-FFF2-40B4-BE49-F238E27FC236}">
-                <a16:creationId xmlns:a16="http://schemas.microsoft.com/office/drawing/2014/main" id="{0A1510FC-1C3E-734B-AC44-840E6B1EE643}"/>
-              </a:ext>
-            </a:extLst>
-          </p:cNvPr>
-          <p:cNvSpPr>
-            <a:spLocks noGrp="1"/>
-          </p:cNvSpPr>
-          <p:nvPr>
-            <p:ph idx="1"/>
-          </p:nvPr>
-        </p:nvSpPr>
-        <p:spPr/>
-        <p:txBody>
-          <a:bodyPr/>
-          <a:lstStyle/>
-          <a:p>
-            <a:r>
-              <a:rPr lang="en-US" dirty="0"/>
-              <a:t>Anyone will be able to access system physically, on campus</a:t>
-            </a:r>
-          </a:p>
-          <a:p>
-            <a:r>
-              <a:rPr lang="en-US" dirty="0"/>
-              <a:t>Network will be secured, data will be stored on server elsewhere </a:t>
-            </a:r>
-          </a:p>
-          <a:p>
-            <a:r>
-              <a:rPr lang="en-US" dirty="0"/>
-              <a:t>Files will be password protected</a:t>
-            </a:r>
-          </a:p>
-          <a:p>
-            <a:endParaRPr lang="en-US" dirty="0"/>
-          </a:p>
-        </p:txBody>
-      </p:sp>
-    </p:spTree>
-    <p:extLst>
-      <p:ext uri="{BB962C8B-B14F-4D97-AF65-F5344CB8AC3E}">
-        <p14:creationId xmlns:p14="http://schemas.microsoft.com/office/powerpoint/2010/main" val="2203638032"/>
+        <p14:creationId xmlns:p14="http://schemas.microsoft.com/office/powerpoint/2010/main" val="1365661393"/>
       </p:ext>
     </p:extLst>
   </p:cSld>

</xml_diff>